<commit_message>
Prasi 3.6. wie gezeigt
</commit_message>
<xml_diff>
--- a/Code/C2C_Gr2_PP2.pptx
+++ b/Code/C2C_Gr2_PP2.pptx
@@ -14412,6 +14412,17 @@
             </a:pPr>
             <a:r>
               <a:rPr lang="de-DE" sz="2400" dirty="0" smtClean="0"/>
+              <a:t>Licht- und Boden-Verhältnisse entscheidend</a:t>
+            </a:r>
+          </a:p>
+          <a:p>
+            <a:pPr>
+              <a:tabLst>
+                <a:tab pos="5021263" algn="l"/>
+              </a:tabLst>
+            </a:pPr>
+            <a:r>
+              <a:rPr lang="de-DE" sz="2400" dirty="0" smtClean="0"/>
               <a:t>Neigungswinkel der Kamera </a:t>
             </a:r>
           </a:p>

</xml_diff>